<commit_message>
Some very simple format handling
</commit_message>
<xml_diff>
--- a/test.pptx
+++ b/test.pptx
@@ -8,6 +8,7 @@
     <p:sldId id="256" r:id="rId2"/>
     <p:sldId id="257" r:id="rId3"/>
     <p:sldId id="258" r:id="rId4"/>
+    <p:sldId id="259" r:id="rId5"/>
   </p:sldIdLst>
   <p:sldSz cx="9144000" cy="6858000" type="screen4x3"/>
   <p:notesSz cx="6858000" cy="9144000"/>
@@ -290,7 +291,7 @@
           <a:p>
             <a:fld id="{C31D80B0-D68A-E448-83F2-6ECE05921AF5}" type="datetimeFigureOut">
               <a:rPr lang="en-US" smtClean="0"/>
-              <a:t>12/17/14</a:t>
+              <a:t>12/19/14</a:t>
             </a:fld>
             <a:endParaRPr lang="en-US"/>
           </a:p>
@@ -460,7 +461,7 @@
           <a:p>
             <a:fld id="{C31D80B0-D68A-E448-83F2-6ECE05921AF5}" type="datetimeFigureOut">
               <a:rPr lang="en-US" smtClean="0"/>
-              <a:t>12/17/14</a:t>
+              <a:t>12/19/14</a:t>
             </a:fld>
             <a:endParaRPr lang="en-US"/>
           </a:p>
@@ -640,7 +641,7 @@
           <a:p>
             <a:fld id="{C31D80B0-D68A-E448-83F2-6ECE05921AF5}" type="datetimeFigureOut">
               <a:rPr lang="en-US" smtClean="0"/>
-              <a:t>12/17/14</a:t>
+              <a:t>12/19/14</a:t>
             </a:fld>
             <a:endParaRPr lang="en-US"/>
           </a:p>
@@ -810,7 +811,7 @@
           <a:p>
             <a:fld id="{C31D80B0-D68A-E448-83F2-6ECE05921AF5}" type="datetimeFigureOut">
               <a:rPr lang="en-US" smtClean="0"/>
-              <a:t>12/17/14</a:t>
+              <a:t>12/19/14</a:t>
             </a:fld>
             <a:endParaRPr lang="en-US"/>
           </a:p>
@@ -1056,7 +1057,7 @@
           <a:p>
             <a:fld id="{C31D80B0-D68A-E448-83F2-6ECE05921AF5}" type="datetimeFigureOut">
               <a:rPr lang="en-US" smtClean="0"/>
-              <a:t>12/17/14</a:t>
+              <a:t>12/19/14</a:t>
             </a:fld>
             <a:endParaRPr lang="en-US"/>
           </a:p>
@@ -1344,7 +1345,7 @@
           <a:p>
             <a:fld id="{C31D80B0-D68A-E448-83F2-6ECE05921AF5}" type="datetimeFigureOut">
               <a:rPr lang="en-US" smtClean="0"/>
-              <a:t>12/17/14</a:t>
+              <a:t>12/19/14</a:t>
             </a:fld>
             <a:endParaRPr lang="en-US"/>
           </a:p>
@@ -1766,7 +1767,7 @@
           <a:p>
             <a:fld id="{C31D80B0-D68A-E448-83F2-6ECE05921AF5}" type="datetimeFigureOut">
               <a:rPr lang="en-US" smtClean="0"/>
-              <a:t>12/17/14</a:t>
+              <a:t>12/19/14</a:t>
             </a:fld>
             <a:endParaRPr lang="en-US"/>
           </a:p>
@@ -1884,7 +1885,7 @@
           <a:p>
             <a:fld id="{C31D80B0-D68A-E448-83F2-6ECE05921AF5}" type="datetimeFigureOut">
               <a:rPr lang="en-US" smtClean="0"/>
-              <a:t>12/17/14</a:t>
+              <a:t>12/19/14</a:t>
             </a:fld>
             <a:endParaRPr lang="en-US"/>
           </a:p>
@@ -1979,7 +1980,7 @@
           <a:p>
             <a:fld id="{C31D80B0-D68A-E448-83F2-6ECE05921AF5}" type="datetimeFigureOut">
               <a:rPr lang="en-US" smtClean="0"/>
-              <a:t>12/17/14</a:t>
+              <a:t>12/19/14</a:t>
             </a:fld>
             <a:endParaRPr lang="en-US"/>
           </a:p>
@@ -2256,7 +2257,7 @@
           <a:p>
             <a:fld id="{C31D80B0-D68A-E448-83F2-6ECE05921AF5}" type="datetimeFigureOut">
               <a:rPr lang="en-US" smtClean="0"/>
-              <a:t>12/17/14</a:t>
+              <a:t>12/19/14</a:t>
             </a:fld>
             <a:endParaRPr lang="en-US"/>
           </a:p>
@@ -2509,7 +2510,7 @@
           <a:p>
             <a:fld id="{C31D80B0-D68A-E448-83F2-6ECE05921AF5}" type="datetimeFigureOut">
               <a:rPr lang="en-US" smtClean="0"/>
-              <a:t>12/17/14</a:t>
+              <a:t>12/19/14</a:t>
             </a:fld>
             <a:endParaRPr lang="en-US"/>
           </a:p>
@@ -2722,7 +2723,7 @@
           <a:p>
             <a:fld id="{C31D80B0-D68A-E448-83F2-6ECE05921AF5}" type="datetimeFigureOut">
               <a:rPr lang="en-US" smtClean="0"/>
-              <a:t>12/17/14</a:t>
+              <a:t>12/19/14</a:t>
             </a:fld>
             <a:endParaRPr lang="en-US"/>
           </a:p>
@@ -3357,6 +3358,121 @@
     <p:extLst>
       <p:ext uri="{BB962C8B-B14F-4D97-AF65-F5344CB8AC3E}">
         <p14:creationId xmlns:p14="http://schemas.microsoft.com/office/powerpoint/2010/main" val="4018407527"/>
+      </p:ext>
+    </p:extLst>
+  </p:cSld>
+  <p:clrMapOvr>
+    <a:masterClrMapping/>
+  </p:clrMapOvr>
+</p:sld>
+</file>
+
+<file path=ppt/slides/slide4.xml><?xml version="1.0" encoding="utf-8"?>
+<p:sld xmlns:a="http://schemas.openxmlformats.org/drawingml/2006/main" xmlns:r="http://schemas.openxmlformats.org/officeDocument/2006/relationships" xmlns:p="http://schemas.openxmlformats.org/presentationml/2006/main">
+  <p:cSld>
+    <p:spTree>
+      <p:nvGrpSpPr>
+        <p:cNvPr id="1" name=""/>
+        <p:cNvGrpSpPr/>
+        <p:nvPr/>
+      </p:nvGrpSpPr>
+      <p:grpSpPr>
+        <a:xfrm>
+          <a:off x="0" y="0"/>
+          <a:ext cx="0" cy="0"/>
+          <a:chOff x="0" y="0"/>
+          <a:chExt cx="0" cy="0"/>
+        </a:xfrm>
+      </p:grpSpPr>
+      <p:sp>
+        <p:nvSpPr>
+          <p:cNvPr id="2" name="Title 1"/>
+          <p:cNvSpPr>
+            <a:spLocks noGrp="1"/>
+          </p:cNvSpPr>
+          <p:nvPr>
+            <p:ph type="title"/>
+          </p:nvPr>
+        </p:nvSpPr>
+        <p:spPr/>
+        <p:txBody>
+          <a:bodyPr/>
+          <a:lstStyle/>
+          <a:p>
+            <a:r>
+              <a:rPr lang="en-US" dirty="0" smtClean="0"/>
+              <a:t>Slide #3</a:t>
+            </a:r>
+            <a:endParaRPr lang="en-US" dirty="0"/>
+          </a:p>
+        </p:txBody>
+      </p:sp>
+      <p:sp>
+        <p:nvSpPr>
+          <p:cNvPr id="3" name="Content Placeholder 2"/>
+          <p:cNvSpPr>
+            <a:spLocks noGrp="1"/>
+          </p:cNvSpPr>
+          <p:nvPr>
+            <p:ph idx="1"/>
+          </p:nvPr>
+        </p:nvSpPr>
+        <p:spPr/>
+        <p:txBody>
+          <a:bodyPr/>
+          <a:lstStyle/>
+          <a:p>
+            <a:pPr marL="0" indent="0">
+              <a:buNone/>
+            </a:pPr>
+            <a:r>
+              <a:rPr lang="en-US" dirty="0" smtClean="0"/>
+              <a:t>Not a bulleted or numbered slide. Text goes here</a:t>
+            </a:r>
+            <a:r>
+              <a:rPr lang="en-US" dirty="0" smtClean="0"/>
+              <a:t>.</a:t>
+            </a:r>
+          </a:p>
+          <a:p>
+            <a:r>
+              <a:rPr lang="en-US" dirty="0" smtClean="0"/>
+              <a:t>Now bullets</a:t>
+            </a:r>
+          </a:p>
+          <a:p>
+            <a:r>
+              <a:rPr lang="en-US" dirty="0" smtClean="0"/>
+              <a:t>One more</a:t>
+            </a:r>
+          </a:p>
+          <a:p>
+            <a:pPr marL="514350" indent="-514350">
+              <a:buFont typeface="+mj-lt"/>
+              <a:buAutoNum type="arabicPeriod"/>
+            </a:pPr>
+            <a:r>
+              <a:rPr lang="en-US" dirty="0" smtClean="0"/>
+              <a:t>Now numbers</a:t>
+            </a:r>
+          </a:p>
+          <a:p>
+            <a:pPr marL="514350" indent="-514350">
+              <a:buFont typeface="+mj-lt"/>
+              <a:buAutoNum type="arabicPeriod"/>
+            </a:pPr>
+            <a:r>
+              <a:rPr lang="en-US" dirty="0" smtClean="0"/>
+              <a:t>One more</a:t>
+            </a:r>
+            <a:endParaRPr lang="en-US" dirty="0"/>
+          </a:p>
+        </p:txBody>
+      </p:sp>
+    </p:spTree>
+    <p:extLst>
+      <p:ext uri="{BB962C8B-B14F-4D97-AF65-F5344CB8AC3E}">
+        <p14:creationId xmlns:p14="http://schemas.microsoft.com/office/powerpoint/2010/main" val="1270639909"/>
       </p:ext>
     </p:extLst>
   </p:cSld>

</xml_diff>

<commit_message>
Can now handle sub bullets/items
Numbers have been changed back to markdown style (non-incrementing).
</commit_message>
<xml_diff>
--- a/test.pptx
+++ b/test.pptx
@@ -3232,9 +3232,19 @@
             <a:pPr lvl="1"/>
             <a:r>
               <a:rPr lang="en-US" dirty="0" smtClean="0"/>
-              <a:t>With a sub-bullet</a:t>
+              <a:t>With a sub-</a:t>
+            </a:r>
+            <a:r>
+              <a:rPr lang="en-US" dirty="0" smtClean="0"/>
+              <a:t>bullet</a:t>
             </a:r>
             <a:endParaRPr lang="en-US" dirty="0"/>
+          </a:p>
+          <a:p>
+            <a:r>
+              <a:rPr lang="en-US" dirty="0" smtClean="0"/>
+              <a:t>And back up a level</a:t>
+            </a:r>
           </a:p>
         </p:txBody>
       </p:sp>
@@ -3342,8 +3352,23 @@
             </a:pPr>
             <a:r>
               <a:rPr lang="en-US" dirty="0" smtClean="0"/>
-              <a:t>With a sub-item</a:t>
-            </a:r>
+              <a:t>With a sub-</a:t>
+            </a:r>
+            <a:r>
+              <a:rPr lang="en-US" dirty="0" smtClean="0"/>
+              <a:t>item</a:t>
+            </a:r>
+          </a:p>
+          <a:p>
+            <a:pPr marL="514350" indent="-514350">
+              <a:buFont typeface="+mj-lt"/>
+              <a:buAutoNum type="arabicPeriod"/>
+            </a:pPr>
+            <a:r>
+              <a:rPr lang="en-US" dirty="0" smtClean="0"/>
+              <a:t>And back up a level</a:t>
+            </a:r>
+            <a:endParaRPr lang="en-US" dirty="0" smtClean="0"/>
           </a:p>
           <a:p>
             <a:pPr marL="514350" indent="-514350">
@@ -3427,18 +3452,26 @@
             </a:pPr>
             <a:r>
               <a:rPr lang="en-US" dirty="0" smtClean="0"/>
-              <a:t>Not a bulleted or numbered slide. Text goes here</a:t>
-            </a:r>
+              <a:t>Not a bulleted or numbered slide. Text goes here.</a:t>
+            </a:r>
+          </a:p>
+          <a:p>
             <a:r>
               <a:rPr lang="en-US" dirty="0" smtClean="0"/>
-              <a:t>.</a:t>
-            </a:r>
-          </a:p>
-          <a:p>
+              <a:t>Now </a:t>
+            </a:r>
             <a:r>
               <a:rPr lang="en-US" dirty="0" smtClean="0"/>
-              <a:t>Now bullets</a:t>
-            </a:r>
+              <a:t>bullets</a:t>
+            </a:r>
+          </a:p>
+          <a:p>
+            <a:pPr lvl="1"/>
+            <a:r>
+              <a:rPr lang="en-US" dirty="0" smtClean="0"/>
+              <a:t>Sub</a:t>
+            </a:r>
+            <a:endParaRPr lang="en-US" dirty="0" smtClean="0"/>
           </a:p>
           <a:p>
             <a:r>
@@ -3453,8 +3486,23 @@
             </a:pPr>
             <a:r>
               <a:rPr lang="en-US" dirty="0" smtClean="0"/>
-              <a:t>Now numbers</a:t>
-            </a:r>
+              <a:t>Now </a:t>
+            </a:r>
+            <a:r>
+              <a:rPr lang="en-US" dirty="0" smtClean="0"/>
+              <a:t>numbers</a:t>
+            </a:r>
+          </a:p>
+          <a:p>
+            <a:pPr marL="914400" lvl="1" indent="-514350">
+              <a:buFont typeface="+mj-lt"/>
+              <a:buAutoNum type="arabicPeriod"/>
+            </a:pPr>
+            <a:r>
+              <a:rPr lang="en-US" dirty="0" smtClean="0"/>
+              <a:t>Sub</a:t>
+            </a:r>
+            <a:endParaRPr lang="en-US" dirty="0" smtClean="0"/>
           </a:p>
           <a:p>
             <a:pPr marL="514350" indent="-514350">

</xml_diff>